<commit_message>
Update UiComponentClassDiagram in Developer Guide
</commit_message>
<xml_diff>
--- a/docs/diagrams/UiComponentClassDiagram.pptx
+++ b/docs/diagrams/UiComponentClassDiagram.pptx
@@ -208,7 +208,7 @@
           <a:p>
             <a:fld id="{F5CC4B3F-88C1-4FFA-B1B6-F41C21DC6924}" type="datetimeFigureOut">
               <a:rPr lang="en-US" smtClean="0"/>
-              <a:t>1/7/2017</a:t>
+              <a:t>10/15/2018</a:t>
             </a:fld>
             <a:endParaRPr lang="en-US"/>
           </a:p>
@@ -654,7 +654,7 @@
           <a:p>
             <a:fld id="{78C97017-6FC3-485B-9764-EAC9E56C1D49}" type="datetimeFigureOut">
               <a:rPr lang="en-US" smtClean="0"/>
-              <a:t>1/7/2017</a:t>
+              <a:t>10/15/2018</a:t>
             </a:fld>
             <a:endParaRPr lang="en-US"/>
           </a:p>
@@ -822,7 +822,7 @@
           <a:p>
             <a:fld id="{78C97017-6FC3-485B-9764-EAC9E56C1D49}" type="datetimeFigureOut">
               <a:rPr lang="en-US" smtClean="0"/>
-              <a:t>1/7/2017</a:t>
+              <a:t>10/15/2018</a:t>
             </a:fld>
             <a:endParaRPr lang="en-US"/>
           </a:p>
@@ -1000,7 +1000,7 @@
           <a:p>
             <a:fld id="{78C97017-6FC3-485B-9764-EAC9E56C1D49}" type="datetimeFigureOut">
               <a:rPr lang="en-US" smtClean="0"/>
-              <a:t>1/7/2017</a:t>
+              <a:t>10/15/2018</a:t>
             </a:fld>
             <a:endParaRPr lang="en-US"/>
           </a:p>
@@ -1168,7 +1168,7 @@
           <a:p>
             <a:fld id="{78C97017-6FC3-485B-9764-EAC9E56C1D49}" type="datetimeFigureOut">
               <a:rPr lang="en-US" smtClean="0"/>
-              <a:t>1/7/2017</a:t>
+              <a:t>10/15/2018</a:t>
             </a:fld>
             <a:endParaRPr lang="en-US"/>
           </a:p>
@@ -1413,7 +1413,7 @@
           <a:p>
             <a:fld id="{78C97017-6FC3-485B-9764-EAC9E56C1D49}" type="datetimeFigureOut">
               <a:rPr lang="en-US" smtClean="0"/>
-              <a:t>1/7/2017</a:t>
+              <a:t>10/15/2018</a:t>
             </a:fld>
             <a:endParaRPr lang="en-US"/>
           </a:p>
@@ -1698,7 +1698,7 @@
           <a:p>
             <a:fld id="{78C97017-6FC3-485B-9764-EAC9E56C1D49}" type="datetimeFigureOut">
               <a:rPr lang="en-US" smtClean="0"/>
-              <a:t>1/7/2017</a:t>
+              <a:t>10/15/2018</a:t>
             </a:fld>
             <a:endParaRPr lang="en-US"/>
           </a:p>
@@ -2117,7 +2117,7 @@
           <a:p>
             <a:fld id="{78C97017-6FC3-485B-9764-EAC9E56C1D49}" type="datetimeFigureOut">
               <a:rPr lang="en-US" smtClean="0"/>
-              <a:t>1/7/2017</a:t>
+              <a:t>10/15/2018</a:t>
             </a:fld>
             <a:endParaRPr lang="en-US"/>
           </a:p>
@@ -2234,7 +2234,7 @@
           <a:p>
             <a:fld id="{78C97017-6FC3-485B-9764-EAC9E56C1D49}" type="datetimeFigureOut">
               <a:rPr lang="en-US" smtClean="0"/>
-              <a:t>1/7/2017</a:t>
+              <a:t>10/15/2018</a:t>
             </a:fld>
             <a:endParaRPr lang="en-US"/>
           </a:p>
@@ -2329,7 +2329,7 @@
           <a:p>
             <a:fld id="{78C97017-6FC3-485B-9764-EAC9E56C1D49}" type="datetimeFigureOut">
               <a:rPr lang="en-US" smtClean="0"/>
-              <a:t>1/7/2017</a:t>
+              <a:t>10/15/2018</a:t>
             </a:fld>
             <a:endParaRPr lang="en-US"/>
           </a:p>
@@ -2604,7 +2604,7 @@
           <a:p>
             <a:fld id="{78C97017-6FC3-485B-9764-EAC9E56C1D49}" type="datetimeFigureOut">
               <a:rPr lang="en-US" smtClean="0"/>
-              <a:t>1/7/2017</a:t>
+              <a:t>10/15/2018</a:t>
             </a:fld>
             <a:endParaRPr lang="en-US"/>
           </a:p>
@@ -2856,7 +2856,7 @@
           <a:p>
             <a:fld id="{78C97017-6FC3-485B-9764-EAC9E56C1D49}" type="datetimeFigureOut">
               <a:rPr lang="en-US" smtClean="0"/>
-              <a:t>1/7/2017</a:t>
+              <a:t>10/15/2018</a:t>
             </a:fld>
             <a:endParaRPr lang="en-US"/>
           </a:p>
@@ -3067,7 +3067,7 @@
           <a:p>
             <a:fld id="{78C97017-6FC3-485B-9764-EAC9E56C1D49}" type="datetimeFigureOut">
               <a:rPr lang="en-US" smtClean="0"/>
-              <a:t>1/7/2017</a:t>
+              <a:t>10/15/2018</a:t>
             </a:fld>
             <a:endParaRPr lang="en-US"/>
           </a:p>
@@ -3545,7 +3545,7 @@
           <a:p>
             <a:pPr algn="ctr"/>
             <a:r>
-              <a:rPr lang="en-US" sz="1050" b="1" dirty="0" err="1">
+              <a:rPr lang="en-US" sz="950" b="1" dirty="0" err="1">
                 <a:solidFill>
                   <a:schemeClr val="accent3">
                     <a:lumMod val="75000"/>
@@ -3554,7 +3554,7 @@
               </a:rPr>
               <a:t>MainWindow</a:t>
             </a:r>
-            <a:endParaRPr lang="en-SG" sz="1050" b="1" dirty="0">
+            <a:endParaRPr lang="en-SG" sz="950" b="1" dirty="0">
               <a:solidFill>
                 <a:schemeClr val="accent3">
                   <a:lumMod val="75000"/>
@@ -3572,7 +3572,7 @@
         </p:nvSpPr>
         <p:spPr>
           <a:xfrm>
-            <a:off x="2592528" y="2971800"/>
+            <a:off x="2592528" y="2895600"/>
             <a:ext cx="1093635" cy="236841"/>
           </a:xfrm>
           <a:prstGeom prst="rect">
@@ -3605,7 +3605,7 @@
           <a:p>
             <a:pPr algn="ctr"/>
             <a:r>
-              <a:rPr lang="en-US" sz="1050" b="1" dirty="0" err="1">
+              <a:rPr lang="en-US" sz="950" b="1" dirty="0" err="1">
                 <a:solidFill>
                   <a:schemeClr val="accent3">
                     <a:lumMod val="75000"/>
@@ -3614,7 +3614,7 @@
               </a:rPr>
               <a:t>CommandBox</a:t>
             </a:r>
-            <a:endParaRPr lang="en-SG" sz="1050" b="1" dirty="0">
+            <a:endParaRPr lang="en-SG" sz="950" b="1" dirty="0">
               <a:solidFill>
                 <a:schemeClr val="accent3">
                   <a:lumMod val="75000"/>
@@ -3668,14 +3668,14 @@
           <a:p>
             <a:pPr algn="ctr"/>
             <a:r>
-              <a:rPr lang="en-US" sz="1050" dirty="0" err="1">
+              <a:rPr lang="en-US" sz="950" dirty="0" err="1">
                 <a:solidFill>
                   <a:schemeClr val="bg1"/>
                 </a:solidFill>
               </a:rPr>
               <a:t>UiManager</a:t>
             </a:r>
-            <a:endParaRPr lang="en-SG" sz="1050" dirty="0">
+            <a:endParaRPr lang="en-SG" sz="950" dirty="0">
               <a:solidFill>
                 <a:schemeClr val="bg1"/>
               </a:solidFill>
@@ -3885,7 +3885,7 @@
         </p:nvSpPr>
         <p:spPr>
           <a:xfrm>
-            <a:off x="2592528" y="3649359"/>
+            <a:off x="2592528" y="3573159"/>
             <a:ext cx="1093635" cy="236841"/>
           </a:xfrm>
           <a:prstGeom prst="rect">
@@ -3918,7 +3918,7 @@
           <a:p>
             <a:pPr algn="ctr"/>
             <a:r>
-              <a:rPr lang="en-US" sz="1050" b="1" dirty="0" err="1">
+              <a:rPr lang="en-US" sz="950" b="1" dirty="0" err="1">
                 <a:solidFill>
                   <a:schemeClr val="accent3">
                     <a:lumMod val="75000"/>
@@ -3927,7 +3927,7 @@
               </a:rPr>
               <a:t>BrowserPanel</a:t>
             </a:r>
-            <a:endParaRPr lang="en-SG" sz="1050" b="1" dirty="0">
+            <a:endParaRPr lang="en-SG" sz="950" b="1" dirty="0">
               <a:solidFill>
                 <a:schemeClr val="accent3">
                   <a:lumMod val="75000"/>
@@ -3945,7 +3945,7 @@
         </p:nvSpPr>
         <p:spPr>
           <a:xfrm>
-            <a:off x="2592527" y="4563759"/>
+            <a:off x="2592527" y="4487559"/>
             <a:ext cx="1093635" cy="236841"/>
           </a:xfrm>
           <a:prstGeom prst="rect">
@@ -3978,7 +3978,7 @@
           <a:p>
             <a:pPr algn="ctr"/>
             <a:r>
-              <a:rPr lang="en-US" sz="1050" b="1" dirty="0" err="1">
+              <a:rPr lang="en-US" sz="950" b="1" dirty="0" err="1">
                 <a:solidFill>
                   <a:schemeClr val="accent3">
                     <a:lumMod val="75000"/>
@@ -3987,7 +3987,7 @@
               </a:rPr>
               <a:t>StatusBarFooter</a:t>
             </a:r>
-            <a:endParaRPr lang="en-SG" sz="1050" b="1" dirty="0">
+            <a:endParaRPr lang="en-SG" sz="950" b="1" dirty="0">
               <a:solidFill>
                 <a:schemeClr val="accent3">
                   <a:lumMod val="75000"/>
@@ -4005,7 +4005,7 @@
         </p:nvSpPr>
         <p:spPr>
           <a:xfrm>
-            <a:off x="2592526" y="3991960"/>
+            <a:off x="2592526" y="3915760"/>
             <a:ext cx="1093635" cy="236841"/>
           </a:xfrm>
           <a:prstGeom prst="rect">
@@ -4038,16 +4038,16 @@
           <a:p>
             <a:pPr algn="ctr"/>
             <a:r>
-              <a:rPr lang="en-US" sz="1050" b="1" dirty="0" err="1">
+              <a:rPr lang="en-US" sz="950" b="1" dirty="0" err="1">
                 <a:solidFill>
                   <a:schemeClr val="accent3">
                     <a:lumMod val="75000"/>
                   </a:schemeClr>
                 </a:solidFill>
               </a:rPr>
-              <a:t>PersonListPanel</a:t>
-            </a:r>
-            <a:endParaRPr lang="en-SG" sz="1050" b="1" dirty="0">
+              <a:t>WorkoutListPanel</a:t>
+            </a:r>
+            <a:endParaRPr lang="en-SG" sz="950" b="1" dirty="0">
               <a:solidFill>
                 <a:schemeClr val="accent3">
                   <a:lumMod val="75000"/>
@@ -4065,7 +4065,7 @@
         </p:nvSpPr>
         <p:spPr>
           <a:xfrm>
-            <a:off x="3839323" y="4228801"/>
+            <a:off x="3839323" y="4152601"/>
             <a:ext cx="1040906" cy="236841"/>
           </a:xfrm>
           <a:prstGeom prst="rect">
@@ -4098,16 +4098,16 @@
           <a:p>
             <a:pPr algn="ctr"/>
             <a:r>
-              <a:rPr lang="en-US" sz="1050" b="1" dirty="0" err="1">
+              <a:rPr lang="en-US" sz="950" b="1" dirty="0" err="1">
                 <a:solidFill>
                   <a:schemeClr val="accent3">
                     <a:lumMod val="75000"/>
                   </a:schemeClr>
                 </a:solidFill>
               </a:rPr>
-              <a:t>PersonCard</a:t>
-            </a:r>
-            <a:endParaRPr lang="en-SG" sz="1050" b="1" dirty="0">
+              <a:t>WorkoutCard</a:t>
+            </a:r>
+            <a:endParaRPr lang="en-SG" sz="950" b="1" dirty="0">
               <a:solidFill>
                 <a:schemeClr val="accent3">
                   <a:lumMod val="75000"/>
@@ -4125,7 +4125,7 @@
         </p:nvSpPr>
         <p:spPr>
           <a:xfrm>
-            <a:off x="2592528" y="4966000"/>
+            <a:off x="2592524" y="4794600"/>
             <a:ext cx="1093635" cy="236841"/>
           </a:xfrm>
           <a:prstGeom prst="rect">
@@ -4158,7 +4158,7 @@
           <a:p>
             <a:pPr algn="ctr"/>
             <a:r>
-              <a:rPr lang="en-US" sz="1050" b="1" dirty="0" err="1">
+              <a:rPr lang="en-US" sz="950" b="1" dirty="0" err="1">
                 <a:solidFill>
                   <a:schemeClr val="accent3">
                     <a:lumMod val="75000"/>
@@ -4167,7 +4167,7 @@
               </a:rPr>
               <a:t>HelpWindow</a:t>
             </a:r>
-            <a:endParaRPr lang="en-SG" sz="1050" b="1" dirty="0">
+            <a:endParaRPr lang="en-SG" sz="950" b="1" dirty="0">
               <a:solidFill>
                 <a:schemeClr val="accent3">
                   <a:lumMod val="75000"/>
@@ -4236,8 +4236,8 @@
         </p:nvCxnSpPr>
         <p:spPr>
           <a:xfrm rot="16200000" flipH="1">
-            <a:off x="2393229" y="2890922"/>
-            <a:ext cx="222196" cy="176402"/>
+            <a:off x="2431329" y="2852822"/>
+            <a:ext cx="145996" cy="176402"/>
           </a:xfrm>
           <a:prstGeom prst="bentConnector2">
             <a:avLst/>
@@ -4274,7 +4274,7 @@
         </p:nvSpPr>
         <p:spPr>
           <a:xfrm>
-            <a:off x="2590799" y="3304308"/>
+            <a:off x="2590799" y="3228108"/>
             <a:ext cx="1095361" cy="236841"/>
           </a:xfrm>
           <a:prstGeom prst="rect">
@@ -4307,7 +4307,7 @@
           <a:p>
             <a:pPr algn="ctr"/>
             <a:r>
-              <a:rPr lang="en-US" sz="1050" b="1" dirty="0" err="1">
+              <a:rPr lang="en-US" sz="950" b="1" dirty="0" err="1">
                 <a:solidFill>
                   <a:schemeClr val="accent3">
                     <a:lumMod val="75000"/>
@@ -4316,7 +4316,7 @@
               </a:rPr>
               <a:t>ResultDisplay</a:t>
             </a:r>
-            <a:endParaRPr lang="en-SG" sz="1050" b="1" dirty="0">
+            <a:endParaRPr lang="en-SG" sz="950" b="1" dirty="0">
               <a:solidFill>
                 <a:schemeClr val="accent3">
                   <a:lumMod val="75000"/>
@@ -4337,8 +4337,8 @@
         </p:nvCxnSpPr>
         <p:spPr>
           <a:xfrm rot="16200000" flipH="1">
-            <a:off x="2054450" y="3229701"/>
-            <a:ext cx="899755" cy="176402"/>
+            <a:off x="2092550" y="3191601"/>
+            <a:ext cx="823555" cy="176402"/>
           </a:xfrm>
           <a:prstGeom prst="bentConnector2">
             <a:avLst/>
@@ -4378,8 +4378,8 @@
         </p:nvCxnSpPr>
         <p:spPr>
           <a:xfrm rot="16200000" flipH="1">
-            <a:off x="1883148" y="3401003"/>
-            <a:ext cx="1242356" cy="176400"/>
+            <a:off x="1921248" y="3362903"/>
+            <a:ext cx="1166156" cy="176400"/>
           </a:xfrm>
           <a:prstGeom prst="bentConnector2">
             <a:avLst/>
@@ -4419,8 +4419,8 @@
         </p:nvCxnSpPr>
         <p:spPr>
           <a:xfrm rot="16200000" flipH="1">
-            <a:off x="1597249" y="3686901"/>
-            <a:ext cx="1814155" cy="176401"/>
+            <a:off x="1635349" y="3648801"/>
+            <a:ext cx="1737955" cy="176401"/>
           </a:xfrm>
           <a:prstGeom prst="bentConnector2">
             <a:avLst/>
@@ -4453,14 +4453,15 @@
         <p:nvCxnSpPr>
           <p:cNvPr id="53" name="Elbow Connector 63"/>
           <p:cNvCxnSpPr>
+            <a:cxnSpLocks/>
             <a:endCxn id="38" idx="1"/>
           </p:cNvCxnSpPr>
           <p:nvPr/>
         </p:nvCxnSpPr>
         <p:spPr>
           <a:xfrm rot="16200000" flipH="1">
-            <a:off x="1184119" y="3676012"/>
-            <a:ext cx="2396440" cy="420377"/>
+            <a:off x="1306645" y="3627141"/>
+            <a:ext cx="2228411" cy="343348"/>
           </a:xfrm>
           <a:prstGeom prst="bentConnector2">
             <a:avLst/>
@@ -4530,7 +4531,7 @@
           <a:p>
             <a:pPr algn="ctr"/>
             <a:r>
-              <a:rPr lang="en-US" sz="1050" b="1" dirty="0">
+              <a:rPr lang="en-US" sz="950" b="1" dirty="0">
                 <a:solidFill>
                   <a:schemeClr val="accent3">
                     <a:lumMod val="75000"/>
@@ -4540,7 +4541,7 @@
               <a:t>{abstract}</a:t>
             </a:r>
             <a:br>
-              <a:rPr lang="en-US" sz="1050" b="1" dirty="0">
+              <a:rPr lang="en-US" sz="950" b="1" dirty="0">
                 <a:solidFill>
                   <a:schemeClr val="accent3">
                     <a:lumMod val="75000"/>
@@ -4549,7 +4550,7 @@
               </a:rPr>
             </a:br>
             <a:r>
-              <a:rPr lang="en-US" sz="1050" b="1" dirty="0" err="1">
+              <a:rPr lang="en-US" sz="950" b="1" dirty="0" err="1">
                 <a:solidFill>
                   <a:schemeClr val="accent3">
                     <a:lumMod val="75000"/>
@@ -4558,7 +4559,7 @@
               </a:rPr>
               <a:t>UiPart</a:t>
             </a:r>
-            <a:endParaRPr lang="en-SG" sz="1050" b="1" dirty="0">
+            <a:endParaRPr lang="en-SG" sz="950" b="1" dirty="0">
               <a:solidFill>
                 <a:schemeClr val="accent3">
                   <a:lumMod val="75000"/>
@@ -4580,7 +4581,7 @@
         <p:spPr>
           <a:xfrm flipV="1">
             <a:off x="3686160" y="2286000"/>
-            <a:ext cx="1843809" cy="1136729"/>
+            <a:ext cx="1843809" cy="1060529"/>
           </a:xfrm>
           <a:prstGeom prst="bentConnector2">
             <a:avLst/>
@@ -4620,8 +4621,8 @@
         </p:nvCxnSpPr>
         <p:spPr>
           <a:xfrm rot="5400000">
-            <a:off x="4174488" y="2991741"/>
-            <a:ext cx="2061222" cy="649740"/>
+            <a:off x="4212588" y="2953641"/>
+            <a:ext cx="1985022" cy="649740"/>
           </a:xfrm>
           <a:prstGeom prst="bentConnector2">
             <a:avLst/>
@@ -4654,6 +4655,7 @@
         <p:nvCxnSpPr>
           <p:cNvPr id="82" name="Elbow Connector 63"/>
           <p:cNvCxnSpPr>
+            <a:cxnSpLocks/>
             <a:stCxn id="16" idx="3"/>
             <a:endCxn id="34" idx="3"/>
           </p:cNvCxnSpPr>
@@ -4661,8 +4663,8 @@
         </p:nvCxnSpPr>
         <p:spPr>
           <a:xfrm rot="5400000">
-            <a:off x="3867176" y="2104987"/>
-            <a:ext cx="1481780" cy="1843806"/>
+            <a:off x="3905276" y="2066887"/>
+            <a:ext cx="1405580" cy="1843806"/>
           </a:xfrm>
           <a:prstGeom prst="bentConnector2">
             <a:avLst/>
@@ -4743,8 +4745,8 @@
         </p:nvCxnSpPr>
         <p:spPr>
           <a:xfrm rot="5400000">
-            <a:off x="3409976" y="2562187"/>
-            <a:ext cx="2396180" cy="1843807"/>
+            <a:off x="3448076" y="2524087"/>
+            <a:ext cx="2319980" cy="1843807"/>
           </a:xfrm>
           <a:prstGeom prst="bentConnector2">
             <a:avLst/>
@@ -4777,6 +4779,7 @@
         <p:nvCxnSpPr>
           <p:cNvPr id="94" name="Elbow Connector 63"/>
           <p:cNvCxnSpPr>
+            <a:cxnSpLocks/>
             <a:stCxn id="16" idx="3"/>
             <a:endCxn id="38" idx="3"/>
           </p:cNvCxnSpPr>
@@ -4784,8 +4787,8 @@
         </p:nvCxnSpPr>
         <p:spPr>
           <a:xfrm rot="5400000">
-            <a:off x="3208856" y="2763307"/>
-            <a:ext cx="2798421" cy="1843806"/>
+            <a:off x="3294554" y="2677605"/>
+            <a:ext cx="2627021" cy="1843810"/>
           </a:xfrm>
           <a:prstGeom prst="bentConnector2">
             <a:avLst/>
@@ -4959,7 +4962,7 @@
           <a:p>
             <a:pPr algn="ctr"/>
             <a:r>
-              <a:rPr lang="en-US" sz="1050" dirty="0">
+              <a:rPr lang="en-US" sz="950" dirty="0">
                 <a:solidFill>
                   <a:schemeClr val="bg1"/>
                 </a:solidFill>
@@ -4970,14 +4973,14 @@
           <a:p>
             <a:pPr algn="ctr"/>
             <a:r>
-              <a:rPr lang="en-US" sz="1050" dirty="0" err="1">
+              <a:rPr lang="en-US" sz="950" dirty="0" err="1">
                 <a:solidFill>
                   <a:schemeClr val="bg1"/>
                 </a:solidFill>
               </a:rPr>
               <a:t>Ui</a:t>
             </a:r>
-            <a:endParaRPr lang="en-SG" sz="1050" dirty="0">
+            <a:endParaRPr lang="en-SG" sz="950" dirty="0">
               <a:solidFill>
                 <a:schemeClr val="bg1"/>
               </a:solidFill>
@@ -5086,8 +5089,8 @@
         </p:nvCxnSpPr>
         <p:spPr>
           <a:xfrm rot="16200000" flipH="1">
-            <a:off x="2226110" y="3058040"/>
-            <a:ext cx="554704" cy="174673"/>
+            <a:off x="2264210" y="3019940"/>
+            <a:ext cx="478504" cy="174673"/>
           </a:xfrm>
           <a:prstGeom prst="bentConnector2">
             <a:avLst/>
@@ -5127,8 +5130,8 @@
         </p:nvCxnSpPr>
         <p:spPr>
           <a:xfrm rot="5400000">
-            <a:off x="4205956" y="1766207"/>
-            <a:ext cx="804221" cy="1843806"/>
+            <a:off x="4244056" y="1728107"/>
+            <a:ext cx="728021" cy="1843806"/>
           </a:xfrm>
           <a:prstGeom prst="bentConnector2">
             <a:avLst/>
@@ -5168,7 +5171,7 @@
         </p:nvCxnSpPr>
         <p:spPr>
           <a:xfrm rot="16200000" flipH="1">
-            <a:off x="3430123" y="3938021"/>
+            <a:off x="3430123" y="3861821"/>
             <a:ext cx="118421" cy="699979"/>
           </a:xfrm>
           <a:prstGeom prst="bentConnector2">
@@ -5209,8 +5212,8 @@
         </p:nvCxnSpPr>
         <p:spPr>
           <a:xfrm rot="5400000">
-            <a:off x="3695875" y="2276286"/>
-            <a:ext cx="1824381" cy="1843808"/>
+            <a:off x="3733975" y="2238186"/>
+            <a:ext cx="1748181" cy="1843808"/>
           </a:xfrm>
           <a:prstGeom prst="bentConnector2">
             <a:avLst/>
@@ -5435,7 +5438,7 @@
         </p:nvSpPr>
         <p:spPr>
           <a:xfrm flipV="1">
-            <a:off x="4114799" y="4472708"/>
+            <a:off x="4114799" y="4419600"/>
             <a:ext cx="2642195" cy="101600"/>
           </a:xfrm>
           <a:custGeom>
@@ -5509,6 +5512,166 @@
           </a:p>
         </p:txBody>
       </p:sp>
+      <p:cxnSp>
+        <p:nvCxnSpPr>
+          <p:cNvPr id="51" name="Elbow Connector 63">
+            <a:extLst>
+              <a:ext uri="{FF2B5EF4-FFF2-40B4-BE49-F238E27FC236}">
+                <a16:creationId xmlns:a16="http://schemas.microsoft.com/office/drawing/2014/main" id="{1630F5E0-F198-4440-A2C3-751541C4D106}"/>
+              </a:ext>
+            </a:extLst>
+          </p:cNvPr>
+          <p:cNvCxnSpPr>
+            <a:cxnSpLocks/>
+            <a:endCxn id="55" idx="1"/>
+          </p:cNvCxnSpPr>
+          <p:nvPr/>
+        </p:nvCxnSpPr>
+        <p:spPr>
+          <a:xfrm rot="16200000" flipH="1">
+            <a:off x="1080113" y="3725018"/>
+            <a:ext cx="2547724" cy="473647"/>
+          </a:xfrm>
+          <a:prstGeom prst="bentConnector2">
+            <a:avLst/>
+          </a:prstGeom>
+          <a:ln w="19050">
+            <a:solidFill>
+              <a:schemeClr val="accent3"/>
+            </a:solidFill>
+            <a:headEnd type="none" w="med" len="med"/>
+            <a:tailEnd type="arrow" w="med" len="med"/>
+          </a:ln>
+          <a:effectLst/>
+        </p:spPr>
+        <p:style>
+          <a:lnRef idx="1">
+            <a:schemeClr val="accent2"/>
+          </a:lnRef>
+          <a:fillRef idx="2">
+            <a:schemeClr val="accent2"/>
+          </a:fillRef>
+          <a:effectRef idx="1">
+            <a:schemeClr val="accent2"/>
+          </a:effectRef>
+          <a:fontRef idx="minor">
+            <a:schemeClr val="dk1"/>
+          </a:fontRef>
+        </p:style>
+      </p:cxnSp>
+      <p:sp>
+        <p:nvSpPr>
+          <p:cNvPr id="55" name="Rectangle 11">
+            <a:extLst>
+              <a:ext uri="{FF2B5EF4-FFF2-40B4-BE49-F238E27FC236}">
+                <a16:creationId xmlns:a16="http://schemas.microsoft.com/office/drawing/2014/main" id="{F71F1F8C-D9D6-4303-9FD3-8E96A9CDAB9C}"/>
+              </a:ext>
+            </a:extLst>
+          </p:cNvPr>
+          <p:cNvSpPr/>
+          <p:nvPr/>
+        </p:nvSpPr>
+        <p:spPr>
+          <a:xfrm>
+            <a:off x="2590799" y="5117283"/>
+            <a:ext cx="1093635" cy="236841"/>
+          </a:xfrm>
+          <a:prstGeom prst="rect">
+            <a:avLst/>
+          </a:prstGeom>
+          <a:ln w="19050">
+            <a:solidFill>
+              <a:schemeClr val="accent3"/>
+            </a:solidFill>
+          </a:ln>
+          <a:effectLst/>
+        </p:spPr>
+        <p:style>
+          <a:lnRef idx="1">
+            <a:schemeClr val="accent3"/>
+          </a:lnRef>
+          <a:fillRef idx="2">
+            <a:schemeClr val="accent3"/>
+          </a:fillRef>
+          <a:effectRef idx="1">
+            <a:schemeClr val="accent3"/>
+          </a:effectRef>
+          <a:fontRef idx="minor">
+            <a:schemeClr val="dk1"/>
+          </a:fontRef>
+        </p:style>
+        <p:txBody>
+          <a:bodyPr rtlCol="0" anchor="ctr"/>
+          <a:lstStyle/>
+          <a:p>
+            <a:pPr algn="ctr"/>
+            <a:r>
+              <a:rPr lang="en-US" sz="950" b="1" dirty="0" err="1">
+                <a:solidFill>
+                  <a:schemeClr val="accent3">
+                    <a:lumMod val="75000"/>
+                  </a:schemeClr>
+                </a:solidFill>
+              </a:rPr>
+              <a:t>ProfileWindow</a:t>
+            </a:r>
+            <a:endParaRPr lang="en-SG" sz="950" b="1" dirty="0">
+              <a:solidFill>
+                <a:schemeClr val="accent3">
+                  <a:lumMod val="75000"/>
+                </a:schemeClr>
+              </a:solidFill>
+            </a:endParaRPr>
+          </a:p>
+        </p:txBody>
+      </p:sp>
+      <p:cxnSp>
+        <p:nvCxnSpPr>
+          <p:cNvPr id="58" name="Elbow Connector 63">
+            <a:extLst>
+              <a:ext uri="{FF2B5EF4-FFF2-40B4-BE49-F238E27FC236}">
+                <a16:creationId xmlns:a16="http://schemas.microsoft.com/office/drawing/2014/main" id="{2E868A89-2325-4383-AD03-E32791C9364C}"/>
+              </a:ext>
+            </a:extLst>
+          </p:cNvPr>
+          <p:cNvCxnSpPr>
+            <a:cxnSpLocks/>
+            <a:endCxn id="55" idx="3"/>
+          </p:cNvCxnSpPr>
+          <p:nvPr/>
+        </p:nvCxnSpPr>
+        <p:spPr>
+          <a:xfrm rot="5400000">
+            <a:off x="3150324" y="2856059"/>
+            <a:ext cx="2913756" cy="1845535"/>
+          </a:xfrm>
+          <a:prstGeom prst="bentConnector2">
+            <a:avLst/>
+          </a:prstGeom>
+          <a:ln w="6350">
+            <a:solidFill>
+              <a:schemeClr val="accent3"/>
+            </a:solidFill>
+            <a:headEnd type="none" w="med" len="med"/>
+            <a:tailEnd type="none" w="med" len="med"/>
+          </a:ln>
+          <a:effectLst/>
+        </p:spPr>
+        <p:style>
+          <a:lnRef idx="1">
+            <a:schemeClr val="accent2"/>
+          </a:lnRef>
+          <a:fillRef idx="2">
+            <a:schemeClr val="accent2"/>
+          </a:fillRef>
+          <a:effectRef idx="1">
+            <a:schemeClr val="accent2"/>
+          </a:effectRef>
+          <a:fontRef idx="minor">
+            <a:schemeClr val="dk1"/>
+          </a:fontRef>
+        </p:style>
+      </p:cxnSp>
     </p:spTree>
     <p:extLst>
       <p:ext uri="{BB962C8B-B14F-4D97-AF65-F5344CB8AC3E}">

</xml_diff>